<commit_message>
sentence case data visualization
</commit_message>
<xml_diff>
--- a/powerpoints/data-visualization.pptx
+++ b/powerpoints/data-visualization.pptx
@@ -3062,7 +3062,7 @@
       </p:pic>
       <p:sp>
         <p:nvSpPr>
-          <p:cNvPr id="122" name="Data Visualization with ggplot2 : : CHEAT SHEET"/>
+          <p:cNvPr id="122" name="Data visualization with ggplot2 : : CHEAT SHEET"/>
           <p:cNvSpPr txBox="1"/>
           <p:nvPr>
             <p:ph type="title"/>
@@ -3083,7 +3083,7 @@
           <a:p>
             <a:pPr/>
             <a:r>
-              <a:t>Data Visualization with ggplot2 : : </a:t>
+              <a:t>Data visualization with ggplot2 : : </a:t>
             </a:r>
             <a:r>
               <a:rPr b="1" sz="3300">

</xml_diff>